<commit_message>
update slider for timer,transform,animation!
</commit_message>
<xml_diff>
--- a/GoogleMap/GoogleMap.pptx
+++ b/GoogleMap/GoogleMap.pptx
@@ -113,6 +113,11 @@
       </a:defRPr>
     </a:lvl9pPr>
   </p:defaultTextStyle>
+  <p:extLst>
+    <p:ext uri="{EFAFB233-063F-42B5-8137-9DF3F51BA10A}">
+      <p15:sldGuideLst xmlns:p15="http://schemas.microsoft.com/office/powerpoint/2012/main"/>
+    </p:ext>
+  </p:extLst>
 </p:presentation>
 </file>
 
@@ -286,7 +291,7 @@
           <a:p>
             <a:fld id="{48A87A34-81AB-432B-8DAE-1953F412C126}" type="datetimeFigureOut">
               <a:rPr lang="en-US" dirty="0"/>
-              <a:t>11/23/19</a:t>
+              <a:t>11/24/19</a:t>
             </a:fld>
             <a:endParaRPr lang="en-US" dirty="0"/>
           </a:p>
@@ -548,7 +553,7 @@
           <a:p>
             <a:fld id="{48A87A34-81AB-432B-8DAE-1953F412C126}" type="datetimeFigureOut">
               <a:rPr lang="en-US" dirty="0"/>
-              <a:t>11/23/19</a:t>
+              <a:t>11/24/19</a:t>
             </a:fld>
             <a:endParaRPr lang="en-US" dirty="0"/>
           </a:p>
@@ -775,7 +780,7 @@
             <a:fld id="{48A87A34-81AB-432B-8DAE-1953F412C126}" type="datetimeFigureOut">
               <a:rPr lang="en-US" dirty="0"/>
               <a:pPr/>
-              <a:t>11/23/19</a:t>
+              <a:t>11/24/19</a:t>
             </a:fld>
             <a:endParaRPr lang="en-US" dirty="0"/>
           </a:p>
@@ -1081,7 +1086,7 @@
             <a:fld id="{48A87A34-81AB-432B-8DAE-1953F412C126}" type="datetimeFigureOut">
               <a:rPr lang="en-US" dirty="0"/>
               <a:pPr/>
-              <a:t>11/23/19</a:t>
+              <a:t>11/24/19</a:t>
             </a:fld>
             <a:endParaRPr lang="en-US" dirty="0"/>
           </a:p>
@@ -1550,7 +1555,7 @@
             <a:fld id="{48A87A34-81AB-432B-8DAE-1953F412C126}" type="datetimeFigureOut">
               <a:rPr lang="en-US" dirty="0"/>
               <a:pPr/>
-              <a:t>11/23/19</a:t>
+              <a:t>11/24/19</a:t>
             </a:fld>
             <a:endParaRPr lang="en-US" dirty="0"/>
           </a:p>
@@ -2092,7 +2097,7 @@
           <a:p>
             <a:fld id="{48A87A34-81AB-432B-8DAE-1953F412C126}" type="datetimeFigureOut">
               <a:rPr lang="en-US" dirty="0"/>
-              <a:t>11/23/19</a:t>
+              <a:t>11/24/19</a:t>
             </a:fld>
             <a:endParaRPr lang="en-US" dirty="0"/>
           </a:p>
@@ -2861,7 +2866,7 @@
           <a:p>
             <a:fld id="{48A87A34-81AB-432B-8DAE-1953F412C126}" type="datetimeFigureOut">
               <a:rPr lang="en-US" dirty="0"/>
-              <a:t>11/23/19</a:t>
+              <a:t>11/24/19</a:t>
             </a:fld>
             <a:endParaRPr lang="en-US" dirty="0"/>
           </a:p>
@@ -3031,7 +3036,7 @@
           <a:p>
             <a:fld id="{48A87A34-81AB-432B-8DAE-1953F412C126}" type="datetimeFigureOut">
               <a:rPr lang="en-US" dirty="0"/>
-              <a:t>11/23/19</a:t>
+              <a:t>11/24/19</a:t>
             </a:fld>
             <a:endParaRPr lang="en-US" dirty="0"/>
           </a:p>
@@ -3250,7 +3255,7 @@
             <a:fld id="{48A87A34-81AB-432B-8DAE-1953F412C126}" type="datetimeFigureOut">
               <a:rPr lang="en-US" dirty="0"/>
               <a:pPr/>
-              <a:t>11/23/19</a:t>
+              <a:t>11/24/19</a:t>
             </a:fld>
             <a:endParaRPr lang="en-US" dirty="0"/>
           </a:p>
@@ -3425,7 +3430,7 @@
           <a:p>
             <a:fld id="{48A87A34-81AB-432B-8DAE-1953F412C126}" type="datetimeFigureOut">
               <a:rPr lang="en-US" dirty="0"/>
-              <a:t>11/23/19</a:t>
+              <a:t>11/24/19</a:t>
             </a:fld>
             <a:endParaRPr lang="en-US" dirty="0"/>
           </a:p>
@@ -3710,7 +3715,7 @@
             <a:fld id="{48A87A34-81AB-432B-8DAE-1953F412C126}" type="datetimeFigureOut">
               <a:rPr lang="en-US" dirty="0"/>
               <a:pPr/>
-              <a:t>11/23/19</a:t>
+              <a:t>11/24/19</a:t>
             </a:fld>
             <a:endParaRPr lang="en-US" dirty="0"/>
           </a:p>
@@ -3947,7 +3952,7 @@
           <a:p>
             <a:fld id="{48A87A34-81AB-432B-8DAE-1953F412C126}" type="datetimeFigureOut">
               <a:rPr lang="en-US" dirty="0"/>
-              <a:t>11/23/19</a:t>
+              <a:t>11/24/19</a:t>
             </a:fld>
             <a:endParaRPr lang="en-US" dirty="0"/>
           </a:p>
@@ -4321,7 +4326,7 @@
           <a:p>
             <a:fld id="{48A87A34-81AB-432B-8DAE-1953F412C126}" type="datetimeFigureOut">
               <a:rPr lang="en-US" dirty="0"/>
-              <a:t>11/23/19</a:t>
+              <a:t>11/24/19</a:t>
             </a:fld>
             <a:endParaRPr lang="en-US" dirty="0"/>
           </a:p>
@@ -4434,7 +4439,7 @@
           <a:p>
             <a:fld id="{48A87A34-81AB-432B-8DAE-1953F412C126}" type="datetimeFigureOut">
               <a:rPr lang="en-US" dirty="0"/>
-              <a:t>11/23/19</a:t>
+              <a:t>11/24/19</a:t>
             </a:fld>
             <a:endParaRPr lang="en-US" dirty="0"/>
           </a:p>
@@ -4524,7 +4529,7 @@
           <a:p>
             <a:fld id="{48A87A34-81AB-432B-8DAE-1953F412C126}" type="datetimeFigureOut">
               <a:rPr lang="en-US" dirty="0"/>
-              <a:t>11/23/19</a:t>
+              <a:t>11/24/19</a:t>
             </a:fld>
             <a:endParaRPr lang="en-US" dirty="0"/>
           </a:p>
@@ -4768,7 +4773,7 @@
           <a:p>
             <a:fld id="{48A87A34-81AB-432B-8DAE-1953F412C126}" type="datetimeFigureOut">
               <a:rPr lang="en-US" dirty="0"/>
-              <a:t>11/23/19</a:t>
+              <a:t>11/24/19</a:t>
             </a:fld>
             <a:endParaRPr lang="en-US" dirty="0"/>
           </a:p>
@@ -5020,7 +5025,7 @@
           <a:p>
             <a:fld id="{48A87A34-81AB-432B-8DAE-1953F412C126}" type="datetimeFigureOut">
               <a:rPr lang="en-US" dirty="0"/>
-              <a:t>11/23/19</a:t>
+              <a:t>11/24/19</a:t>
             </a:fld>
             <a:endParaRPr lang="en-US" dirty="0"/>
           </a:p>
@@ -5259,7 +5264,7 @@
             <a:fld id="{48A87A34-81AB-432B-8DAE-1953F412C126}" type="datetimeFigureOut">
               <a:rPr lang="en-US" dirty="0"/>
               <a:pPr/>
-              <a:t>11/23/19</a:t>
+              <a:t>11/24/19</a:t>
             </a:fld>
             <a:endParaRPr lang="en-US" dirty="0"/>
           </a:p>
@@ -7595,7 +7600,7 @@
                 <a:latin typeface="Arial" panose="020B0604020202020204" pitchFamily="34" charset="0"/>
                 <a:cs typeface="Arial" panose="020B0604020202020204" pitchFamily="34" charset="0"/>
               </a:rPr>
-              <a:t> 30 </a:t>
+              <a:t> 360 </a:t>
             </a:r>
             <a:r>
               <a:rPr lang="en-US" sz="2200" dirty="0" err="1">

</xml_diff>